<commit_message>
Update data sampai 30 Maret 2020
</commit_message>
<xml_diff>
--- a/PPT-ADB-Predicting Covid19 death cases in Indonesia.pptx
+++ b/PPT-ADB-Predicting Covid19 death cases in Indonesia.pptx
@@ -12,8 +12,9 @@
     <p:sldId id="260" r:id="rId6"/>
     <p:sldId id="261" r:id="rId7"/>
     <p:sldId id="264" r:id="rId8"/>
-    <p:sldId id="262" r:id="rId9"/>
-    <p:sldId id="263" r:id="rId10"/>
+    <p:sldId id="265" r:id="rId9"/>
+    <p:sldId id="262" r:id="rId10"/>
+    <p:sldId id="263" r:id="rId11"/>
   </p:sldIdLst>
   <p:sldSz cx="12192000" cy="6858000"/>
   <p:notesSz cx="6858000" cy="9144000"/>
@@ -112,6 +113,11 @@
       </a:defRPr>
     </a:lvl9pPr>
   </p:defaultTextStyle>
+  <p:extLst>
+    <p:ext uri="{EFAFB233-063F-42B5-8137-9DF3F51BA10A}">
+      <p15:sldGuideLst xmlns:p15="http://schemas.microsoft.com/office/powerpoint/2012/main"/>
+    </p:ext>
+  </p:extLst>
 </p:presentation>
 </file>
 
@@ -246,7 +252,7 @@
           <a:p>
             <a:fld id="{CBE4B8D3-EA78-4A17-AD31-EB0210329725}" type="datetimeFigureOut">
               <a:rPr lang="en-US" smtClean="0"/>
-              <a:t>3/29/2020</a:t>
+              <a:t>3/30/2020</a:t>
             </a:fld>
             <a:endParaRPr lang="en-US"/>
           </a:p>
@@ -416,7 +422,7 @@
           <a:p>
             <a:fld id="{CBE4B8D3-EA78-4A17-AD31-EB0210329725}" type="datetimeFigureOut">
               <a:rPr lang="en-US" smtClean="0"/>
-              <a:t>3/29/2020</a:t>
+              <a:t>3/30/2020</a:t>
             </a:fld>
             <a:endParaRPr lang="en-US"/>
           </a:p>
@@ -596,7 +602,7 @@
           <a:p>
             <a:fld id="{CBE4B8D3-EA78-4A17-AD31-EB0210329725}" type="datetimeFigureOut">
               <a:rPr lang="en-US" smtClean="0"/>
-              <a:t>3/29/2020</a:t>
+              <a:t>3/30/2020</a:t>
             </a:fld>
             <a:endParaRPr lang="en-US"/>
           </a:p>
@@ -766,7 +772,7 @@
           <a:p>
             <a:fld id="{CBE4B8D3-EA78-4A17-AD31-EB0210329725}" type="datetimeFigureOut">
               <a:rPr lang="en-US" smtClean="0"/>
-              <a:t>3/29/2020</a:t>
+              <a:t>3/30/2020</a:t>
             </a:fld>
             <a:endParaRPr lang="en-US"/>
           </a:p>
@@ -1012,7 +1018,7 @@
           <a:p>
             <a:fld id="{CBE4B8D3-EA78-4A17-AD31-EB0210329725}" type="datetimeFigureOut">
               <a:rPr lang="en-US" smtClean="0"/>
-              <a:t>3/29/2020</a:t>
+              <a:t>3/30/2020</a:t>
             </a:fld>
             <a:endParaRPr lang="en-US"/>
           </a:p>
@@ -1244,7 +1250,7 @@
           <a:p>
             <a:fld id="{CBE4B8D3-EA78-4A17-AD31-EB0210329725}" type="datetimeFigureOut">
               <a:rPr lang="en-US" smtClean="0"/>
-              <a:t>3/29/2020</a:t>
+              <a:t>3/30/2020</a:t>
             </a:fld>
             <a:endParaRPr lang="en-US"/>
           </a:p>
@@ -1611,7 +1617,7 @@
           <a:p>
             <a:fld id="{CBE4B8D3-EA78-4A17-AD31-EB0210329725}" type="datetimeFigureOut">
               <a:rPr lang="en-US" smtClean="0"/>
-              <a:t>3/29/2020</a:t>
+              <a:t>3/30/2020</a:t>
             </a:fld>
             <a:endParaRPr lang="en-US"/>
           </a:p>
@@ -1729,7 +1735,7 @@
           <a:p>
             <a:fld id="{CBE4B8D3-EA78-4A17-AD31-EB0210329725}" type="datetimeFigureOut">
               <a:rPr lang="en-US" smtClean="0"/>
-              <a:t>3/29/2020</a:t>
+              <a:t>3/30/2020</a:t>
             </a:fld>
             <a:endParaRPr lang="en-US"/>
           </a:p>
@@ -1824,7 +1830,7 @@
           <a:p>
             <a:fld id="{CBE4B8D3-EA78-4A17-AD31-EB0210329725}" type="datetimeFigureOut">
               <a:rPr lang="en-US" smtClean="0"/>
-              <a:t>3/29/2020</a:t>
+              <a:t>3/30/2020</a:t>
             </a:fld>
             <a:endParaRPr lang="en-US"/>
           </a:p>
@@ -2101,7 +2107,7 @@
           <a:p>
             <a:fld id="{CBE4B8D3-EA78-4A17-AD31-EB0210329725}" type="datetimeFigureOut">
               <a:rPr lang="en-US" smtClean="0"/>
-              <a:t>3/29/2020</a:t>
+              <a:t>3/30/2020</a:t>
             </a:fld>
             <a:endParaRPr lang="en-US"/>
           </a:p>
@@ -2354,7 +2360,7 @@
           <a:p>
             <a:fld id="{CBE4B8D3-EA78-4A17-AD31-EB0210329725}" type="datetimeFigureOut">
               <a:rPr lang="en-US" smtClean="0"/>
-              <a:t>3/29/2020</a:t>
+              <a:t>3/30/2020</a:t>
             </a:fld>
             <a:endParaRPr lang="en-US"/>
           </a:p>
@@ -2567,7 +2573,7 @@
           <a:p>
             <a:fld id="{CBE4B8D3-EA78-4A17-AD31-EB0210329725}" type="datetimeFigureOut">
               <a:rPr lang="en-US" smtClean="0"/>
-              <a:t>3/29/2020</a:t>
+              <a:t>3/30/2020</a:t>
             </a:fld>
             <a:endParaRPr lang="en-US"/>
           </a:p>
@@ -3088,6 +3094,198 @@
 </p:sld>
 </file>
 
+<file path=ppt/slides/slide10.xml><?xml version="1.0" encoding="utf-8"?>
+<p:sld xmlns:a="http://schemas.openxmlformats.org/drawingml/2006/main" xmlns:r="http://schemas.openxmlformats.org/officeDocument/2006/relationships" xmlns:p="http://schemas.openxmlformats.org/presentationml/2006/main">
+  <p:cSld>
+    <p:spTree>
+      <p:nvGrpSpPr>
+        <p:cNvPr id="1" name=""/>
+        <p:cNvGrpSpPr/>
+        <p:nvPr/>
+      </p:nvGrpSpPr>
+      <p:grpSpPr>
+        <a:xfrm>
+          <a:off x="0" y="0"/>
+          <a:ext cx="0" cy="0"/>
+          <a:chOff x="0" y="0"/>
+          <a:chExt cx="0" cy="0"/>
+        </a:xfrm>
+      </p:grpSpPr>
+      <p:sp>
+        <p:nvSpPr>
+          <p:cNvPr id="2" name="Title 1"/>
+          <p:cNvSpPr>
+            <a:spLocks noGrp="1"/>
+          </p:cNvSpPr>
+          <p:nvPr>
+            <p:ph type="title"/>
+          </p:nvPr>
+        </p:nvSpPr>
+        <p:spPr/>
+        <p:txBody>
+          <a:bodyPr/>
+          <a:lstStyle/>
+          <a:p>
+            <a:r>
+              <a:rPr lang="en-US" dirty="0" smtClean="0"/>
+              <a:t>Cara </a:t>
+            </a:r>
+            <a:r>
+              <a:rPr lang="en-US" dirty="0" err="1" smtClean="0"/>
+              <a:t>mengkonfirmasi</a:t>
+            </a:r>
+            <a:r>
+              <a:rPr lang="en-US" dirty="0" smtClean="0"/>
+              <a:t> </a:t>
+            </a:r>
+            <a:r>
+              <a:rPr lang="en-US" dirty="0" err="1" smtClean="0"/>
+              <a:t>hasil</a:t>
+            </a:r>
+            <a:endParaRPr lang="en-US" dirty="0"/>
+          </a:p>
+        </p:txBody>
+      </p:sp>
+      <p:sp>
+        <p:nvSpPr>
+          <p:cNvPr id="3" name="Content Placeholder 2"/>
+          <p:cNvSpPr>
+            <a:spLocks noGrp="1"/>
+          </p:cNvSpPr>
+          <p:nvPr>
+            <p:ph idx="1"/>
+          </p:nvPr>
+        </p:nvSpPr>
+        <p:spPr/>
+        <p:txBody>
+          <a:bodyPr/>
+          <a:lstStyle/>
+          <a:p>
+            <a:r>
+              <a:rPr lang="en-ID" dirty="0" err="1" smtClean="0"/>
+              <a:t>Membandingkan</a:t>
+            </a:r>
+            <a:r>
+              <a:rPr lang="en-ID" dirty="0" smtClean="0"/>
+              <a:t> data </a:t>
+            </a:r>
+            <a:r>
+              <a:rPr lang="en-ID" dirty="0" err="1" smtClean="0"/>
+              <a:t>hasil</a:t>
+            </a:r>
+            <a:r>
+              <a:rPr lang="en-ID" dirty="0" smtClean="0"/>
+              <a:t> </a:t>
+            </a:r>
+            <a:r>
+              <a:rPr lang="en-ID" dirty="0" err="1" smtClean="0"/>
+              <a:t>prediksi</a:t>
+            </a:r>
+            <a:r>
+              <a:rPr lang="en-ID" dirty="0" smtClean="0"/>
+              <a:t> </a:t>
+            </a:r>
+            <a:r>
+              <a:rPr lang="en-ID" dirty="0" err="1" smtClean="0"/>
+              <a:t>dengan</a:t>
+            </a:r>
+            <a:r>
+              <a:rPr lang="en-ID" dirty="0" smtClean="0"/>
+              <a:t> data </a:t>
+            </a:r>
+            <a:r>
+              <a:rPr lang="en-ID" dirty="0" err="1" smtClean="0"/>
+              <a:t>asli</a:t>
+            </a:r>
+            <a:r>
+              <a:rPr lang="en-ID" dirty="0" smtClean="0"/>
+              <a:t> yang </a:t>
+            </a:r>
+            <a:r>
+              <a:rPr lang="en-ID" dirty="0" err="1" smtClean="0"/>
+              <a:t>dikeluarkan</a:t>
+            </a:r>
+            <a:r>
+              <a:rPr lang="en-ID" dirty="0" smtClean="0"/>
+              <a:t> </a:t>
+            </a:r>
+            <a:r>
+              <a:rPr lang="en-ID" dirty="0" err="1" smtClean="0"/>
+              <a:t>oleh</a:t>
+            </a:r>
+            <a:r>
+              <a:rPr lang="en-ID" dirty="0" smtClean="0"/>
+              <a:t> </a:t>
+            </a:r>
+            <a:r>
+              <a:rPr lang="en-ID" dirty="0" err="1" smtClean="0"/>
+              <a:t>pemerintah</a:t>
+            </a:r>
+            <a:r>
+              <a:rPr lang="en-ID" dirty="0" smtClean="0"/>
+              <a:t> </a:t>
+            </a:r>
+            <a:r>
+              <a:rPr lang="en-ID" dirty="0" err="1" smtClean="0"/>
+              <a:t>Republik</a:t>
+            </a:r>
+            <a:r>
+              <a:rPr lang="en-ID" dirty="0" smtClean="0"/>
+              <a:t> Indonesia</a:t>
+            </a:r>
+          </a:p>
+          <a:p>
+            <a:r>
+              <a:rPr lang="en-ID" dirty="0" smtClean="0"/>
+              <a:t>Data </a:t>
+            </a:r>
+            <a:r>
+              <a:rPr lang="en-ID" dirty="0" err="1" smtClean="0"/>
+              <a:t>asli</a:t>
+            </a:r>
+            <a:r>
+              <a:rPr lang="en-ID" dirty="0" smtClean="0"/>
+              <a:t> </a:t>
+            </a:r>
+            <a:r>
+              <a:rPr lang="en-ID" dirty="0" err="1" smtClean="0"/>
+              <a:t>diperoleh</a:t>
+            </a:r>
+            <a:r>
+              <a:rPr lang="en-ID" dirty="0" smtClean="0"/>
+              <a:t> </a:t>
+            </a:r>
+            <a:r>
+              <a:rPr lang="en-ID" dirty="0" err="1" smtClean="0"/>
+              <a:t>dari</a:t>
+            </a:r>
+            <a:r>
+              <a:rPr lang="en-ID" dirty="0" smtClean="0"/>
+              <a:t> </a:t>
+            </a:r>
+            <a:r>
+              <a:rPr lang="en-US" dirty="0" smtClean="0">
+                <a:hlinkClick r:id="rId2"/>
+              </a:rPr>
+              <a:t>https://www.covid19.go.id/situasi-virus-corona/</a:t>
+            </a:r>
+            <a:endParaRPr lang="en-US" dirty="0"/>
+          </a:p>
+        </p:txBody>
+      </p:sp>
+    </p:spTree>
+    <p:extLst>
+      <p:ext uri="{BB962C8B-B14F-4D97-AF65-F5344CB8AC3E}">
+        <p14:creationId xmlns:p14="http://schemas.microsoft.com/office/powerpoint/2010/main" val="1386090358"/>
+      </p:ext>
+    </p:extLst>
+  </p:cSld>
+  <p:clrMapOvr>
+    <a:masterClrMapping/>
+  </p:clrMapOvr>
+</p:sld>
+</file>
+
 <file path=ppt/slides/slide2.xml><?xml version="1.0" encoding="utf-8"?>
 <p:sld xmlns:a="http://schemas.openxmlformats.org/drawingml/2006/main" xmlns:r="http://schemas.openxmlformats.org/officeDocument/2006/relationships" xmlns:p="http://schemas.openxmlformats.org/presentationml/2006/main">
   <p:cSld>
@@ -3678,7 +3876,15 @@
             </a:r>
             <a:r>
               <a:rPr lang="en-ID" dirty="0" smtClean="0"/>
-              <a:t> 22 </a:t>
+              <a:t> </a:t>
+            </a:r>
+            <a:r>
+              <a:rPr lang="en-ID" dirty="0" smtClean="0"/>
+              <a:t>30</a:t>
+            </a:r>
+            <a:r>
+              <a:rPr lang="en-ID" dirty="0" smtClean="0"/>
+              <a:t> </a:t>
             </a:r>
             <a:r>
               <a:rPr lang="en-ID" dirty="0" err="1" smtClean="0"/>
@@ -3756,7 +3962,11 @@
             </a:r>
             <a:r>
               <a:rPr lang="en-ID" dirty="0" smtClean="0"/>
-              <a:t> 22 </a:t>
+              <a:t> </a:t>
+            </a:r>
+            <a:r>
+              <a:rPr lang="en-ID" dirty="0" smtClean="0"/>
+              <a:t>30 </a:t>
             </a:r>
             <a:r>
               <a:rPr lang="en-ID" dirty="0" err="1" smtClean="0"/>
@@ -3776,7 +3986,31 @@
               <a:rPr lang="en-US" dirty="0" smtClean="0">
                 <a:hlinkClick r:id="rId2"/>
               </a:rPr>
-              <a:t>https://www.kaggle.com/ardisragen/indonesia-coronavirus-cases</a:t>
+              <a:t>https://</a:t>
+            </a:r>
+            <a:r>
+              <a:rPr lang="en-US" dirty="0" smtClean="0">
+                <a:hlinkClick r:id="rId2"/>
+              </a:rPr>
+              <a:t>www.kaggle.com/ardisragen/indonesia-coronavirus-cases</a:t>
+            </a:r>
+            <a:r>
+              <a:rPr lang="en-US" dirty="0" smtClean="0"/>
+              <a:t> </a:t>
+            </a:r>
+            <a:r>
+              <a:rPr lang="en-US" dirty="0" err="1" smtClean="0"/>
+              <a:t>dan</a:t>
+            </a:r>
+            <a:r>
+              <a:rPr lang="en-US" dirty="0" smtClean="0"/>
+              <a:t> </a:t>
+            </a:r>
+            <a:r>
+              <a:rPr lang="en-US" dirty="0">
+                <a:hlinkClick r:id="rId3"/>
+              </a:rPr>
+              <a:t>https://www.covid19.go.id/situasi-virus-corona/</a:t>
             </a:r>
             <a:endParaRPr lang="en-US" dirty="0"/>
           </a:p>
@@ -3876,7 +4110,11 @@
             </a:r>
             <a:r>
               <a:rPr lang="en-ID" dirty="0" smtClean="0"/>
-              <a:t> model logistic </a:t>
+              <a:t> </a:t>
+            </a:r>
+            <a:r>
+              <a:rPr lang="en-ID" dirty="0"/>
+              <a:t>logistic model </a:t>
             </a:r>
             <a:r>
               <a:rPr lang="en-ID" dirty="0" err="1" smtClean="0"/>
@@ -3955,7 +4193,11 @@
             </a:r>
             <a:r>
               <a:rPr lang="en-ID" dirty="0" smtClean="0"/>
-              <a:t> model logistic </a:t>
+              <a:t> </a:t>
+            </a:r>
+            <a:r>
+              <a:rPr lang="en-ID" dirty="0"/>
+              <a:t>logistic model </a:t>
             </a:r>
             <a:r>
               <a:rPr lang="en-ID" dirty="0" err="1" smtClean="0"/>
@@ -4153,7 +4395,6 @@
               <a:rPr lang="en-US" dirty="0" smtClean="0"/>
               <a:t> – Logistic Model</a:t>
             </a:r>
-            <a:endParaRPr lang="en-US" dirty="0" smtClean="0"/>
           </a:p>
         </p:txBody>
       </p:sp>
@@ -4167,13 +4408,13 @@
             <p:ph idx="1"/>
             <p:extLst>
               <p:ext uri="{D42A27DB-BD31-4B8C-83A1-F6EECF244321}">
-                <p14:modId xmlns:p14="http://schemas.microsoft.com/office/powerpoint/2010/main" val="3816914292"/>
+                <p14:modId xmlns:p14="http://schemas.microsoft.com/office/powerpoint/2010/main" val="1213573439"/>
               </p:ext>
             </p:extLst>
           </p:nvPr>
         </p:nvGraphicFramePr>
         <p:xfrm>
-          <a:off x="2327076" y="1690688"/>
+          <a:off x="1243607" y="1690688"/>
           <a:ext cx="7537848" cy="3708400"/>
         </p:xfrm>
         <a:graphic>
@@ -4750,6 +4991,10 @@
                     <a:lstStyle/>
                     <a:p>
                       <a:pPr algn="ctr"/>
+                      <a:r>
+                        <a:rPr lang="en-ID" dirty="0" smtClean="0"/>
+                        <a:t>114</a:t>
+                      </a:r>
                       <a:endParaRPr lang="en-US" dirty="0"/>
                     </a:p>
                   </a:txBody>
@@ -4816,6 +5061,10 @@
                     <a:lstStyle/>
                     <a:p>
                       <a:pPr algn="ctr"/>
+                      <a:r>
+                        <a:rPr lang="en-ID" dirty="0" smtClean="0"/>
+                        <a:t>122</a:t>
+                      </a:r>
                       <a:endParaRPr lang="en-US" dirty="0"/>
                     </a:p>
                   </a:txBody>
@@ -4882,6 +5131,180 @@
                     <a:lstStyle/>
                     <a:p>
                       <a:pPr algn="ctr"/>
+                      <a:endParaRPr lang="en-US" dirty="0"/>
+                    </a:p>
+                  </a:txBody>
+                  <a:tcPr/>
+                </a:tc>
+              </a:tr>
+            </a:tbl>
+          </a:graphicData>
+        </a:graphic>
+      </p:graphicFrame>
+      <p:sp>
+        <p:nvSpPr>
+          <p:cNvPr id="3" name="TextBox 2"/>
+          <p:cNvSpPr txBox="1"/>
+          <p:nvPr/>
+        </p:nvSpPr>
+        <p:spPr>
+          <a:xfrm>
+            <a:off x="838200" y="5557837"/>
+            <a:ext cx="7806111" cy="369332"/>
+          </a:xfrm>
+          <a:prstGeom prst="rect">
+            <a:avLst/>
+          </a:prstGeom>
+          <a:noFill/>
+        </p:spPr>
+        <p:txBody>
+          <a:bodyPr wrap="none" rtlCol="0">
+            <a:spAutoFit/>
+          </a:bodyPr>
+          <a:lstStyle/>
+          <a:p>
+            <a:r>
+              <a:rPr lang="en-ID" dirty="0" smtClean="0"/>
+              <a:t>Data yang </a:t>
+            </a:r>
+            <a:r>
+              <a:rPr lang="en-ID" dirty="0" err="1" smtClean="0"/>
+              <a:t>digunakan</a:t>
+            </a:r>
+            <a:r>
+              <a:rPr lang="en-ID" dirty="0" smtClean="0"/>
+              <a:t> </a:t>
+            </a:r>
+            <a:r>
+              <a:rPr lang="en-ID" dirty="0" err="1" smtClean="0"/>
+              <a:t>adalah</a:t>
+            </a:r>
+            <a:r>
+              <a:rPr lang="en-ID" dirty="0" smtClean="0"/>
+              <a:t> data </a:t>
+            </a:r>
+            <a:r>
+              <a:rPr lang="en-ID" dirty="0" err="1" smtClean="0"/>
+              <a:t>jumlah</a:t>
+            </a:r>
+            <a:r>
+              <a:rPr lang="en-ID" dirty="0" smtClean="0"/>
+              <a:t> </a:t>
+            </a:r>
+            <a:r>
+              <a:rPr lang="en-ID" dirty="0" err="1" smtClean="0"/>
+              <a:t>kematian</a:t>
+            </a:r>
+            <a:r>
+              <a:rPr lang="en-ID" dirty="0" smtClean="0"/>
+              <a:t> </a:t>
+            </a:r>
+            <a:r>
+              <a:rPr lang="en-ID" dirty="0" err="1" smtClean="0"/>
+              <a:t>sampai</a:t>
+            </a:r>
+            <a:r>
+              <a:rPr lang="en-ID" dirty="0" smtClean="0"/>
+              <a:t> </a:t>
+            </a:r>
+            <a:r>
+              <a:rPr lang="en-ID" dirty="0" err="1" smtClean="0"/>
+              <a:t>tanggal</a:t>
+            </a:r>
+            <a:r>
+              <a:rPr lang="en-ID" dirty="0" smtClean="0"/>
+              <a:t> 22 </a:t>
+            </a:r>
+            <a:r>
+              <a:rPr lang="en-ID" dirty="0" err="1" smtClean="0"/>
+              <a:t>Maret</a:t>
+            </a:r>
+            <a:r>
+              <a:rPr lang="en-ID" dirty="0" smtClean="0"/>
+              <a:t> 2020</a:t>
+            </a:r>
+          </a:p>
+        </p:txBody>
+      </p:sp>
+      <p:graphicFrame>
+        <p:nvGraphicFramePr>
+          <p:cNvPr id="5" name="Table 4"/>
+          <p:cNvGraphicFramePr>
+            <a:graphicFrameLocks noGrp="1"/>
+          </p:cNvGraphicFramePr>
+          <p:nvPr>
+            <p:extLst>
+              <p:ext uri="{D42A27DB-BD31-4B8C-83A1-F6EECF244321}">
+                <p14:modId xmlns:p14="http://schemas.microsoft.com/office/powerpoint/2010/main" val="3819086097"/>
+              </p:ext>
+            </p:extLst>
+          </p:nvPr>
+        </p:nvGraphicFramePr>
+        <p:xfrm>
+          <a:off x="9186861" y="1690688"/>
+          <a:ext cx="2435202" cy="1010920"/>
+        </p:xfrm>
+        <a:graphic>
+          <a:graphicData uri="http://schemas.openxmlformats.org/drawingml/2006/table">
+            <a:tbl>
+              <a:tblPr firstRow="1" bandRow="1">
+                <a:tableStyleId>{5C22544A-7EE6-4342-B048-85BDC9FD1C3A}</a:tableStyleId>
+              </a:tblPr>
+              <a:tblGrid>
+                <a:gridCol w="2435202"/>
+              </a:tblGrid>
+              <a:tr h="370840">
+                <a:tc>
+                  <a:txBody>
+                    <a:bodyPr/>
+                    <a:lstStyle/>
+                    <a:p>
+                      <a:pPr algn="ctr"/>
+                      <a:r>
+                        <a:rPr lang="en-ID" dirty="0" err="1" smtClean="0"/>
+                        <a:t>Prediksi</a:t>
+                      </a:r>
+                      <a:r>
+                        <a:rPr lang="en-ID" dirty="0" smtClean="0"/>
+                        <a:t> </a:t>
+                      </a:r>
+                      <a:r>
+                        <a:rPr lang="en-ID" dirty="0" err="1" smtClean="0"/>
+                        <a:t>Jumlah</a:t>
+                      </a:r>
+                      <a:r>
+                        <a:rPr lang="en-ID" dirty="0" smtClean="0"/>
+                        <a:t> </a:t>
+                      </a:r>
+                      <a:r>
+                        <a:rPr lang="en-ID" dirty="0" err="1" smtClean="0"/>
+                        <a:t>Kematian</a:t>
+                      </a:r>
+                      <a:r>
+                        <a:rPr lang="en-ID" dirty="0" smtClean="0"/>
+                        <a:t> </a:t>
+                      </a:r>
+                      <a:r>
+                        <a:rPr lang="en-ID" dirty="0" err="1" smtClean="0"/>
+                        <a:t>Maks</a:t>
+                      </a:r>
+                      <a:endParaRPr lang="en-US" dirty="0"/>
+                    </a:p>
+                  </a:txBody>
+                  <a:tcPr/>
+                </a:tc>
+              </a:tr>
+              <a:tr h="370840">
+                <a:tc>
+                  <a:txBody>
+                    <a:bodyPr/>
+                    <a:lstStyle/>
+                    <a:p>
+                      <a:pPr algn="ctr"/>
+                      <a:r>
+                        <a:rPr lang="en-ID" dirty="0" smtClean="0"/>
+                        <a:t>82</a:t>
+                      </a:r>
                       <a:endParaRPr lang="en-US" dirty="0"/>
                     </a:p>
                   </a:txBody>
@@ -4970,7 +5393,7 @@
           <p:nvPr>
             <p:extLst>
               <p:ext uri="{D42A27DB-BD31-4B8C-83A1-F6EECF244321}">
-                <p14:modId xmlns:p14="http://schemas.microsoft.com/office/powerpoint/2010/main" val="469926148"/>
+                <p14:modId xmlns:p14="http://schemas.microsoft.com/office/powerpoint/2010/main" val="44553334"/>
               </p:ext>
             </p:extLst>
           </p:nvPr>
@@ -5553,6 +5976,10 @@
                     <a:lstStyle/>
                     <a:p>
                       <a:pPr algn="ctr"/>
+                      <a:r>
+                        <a:rPr lang="en-ID" dirty="0" smtClean="0"/>
+                        <a:t>114</a:t>
+                      </a:r>
                       <a:endParaRPr lang="en-US" dirty="0"/>
                     </a:p>
                   </a:txBody>
@@ -5619,6 +6046,10 @@
                     <a:lstStyle/>
                     <a:p>
                       <a:pPr algn="ctr"/>
+                      <a:r>
+                        <a:rPr lang="en-ID" dirty="0" smtClean="0"/>
+                        <a:t>122</a:t>
+                      </a:r>
                       <a:endParaRPr lang="en-US" dirty="0"/>
                     </a:p>
                   </a:txBody>
@@ -5695,6 +6126,91 @@
           </a:graphicData>
         </a:graphic>
       </p:graphicFrame>
+      <p:sp>
+        <p:nvSpPr>
+          <p:cNvPr id="4" name="TextBox 3"/>
+          <p:cNvSpPr txBox="1"/>
+          <p:nvPr/>
+        </p:nvSpPr>
+        <p:spPr>
+          <a:xfrm>
+            <a:off x="838200" y="5557837"/>
+            <a:ext cx="7806111" cy="369332"/>
+          </a:xfrm>
+          <a:prstGeom prst="rect">
+            <a:avLst/>
+          </a:prstGeom>
+          <a:noFill/>
+        </p:spPr>
+        <p:txBody>
+          <a:bodyPr wrap="none" rtlCol="0">
+            <a:spAutoFit/>
+          </a:bodyPr>
+          <a:lstStyle/>
+          <a:p>
+            <a:r>
+              <a:rPr lang="en-ID" dirty="0" smtClean="0"/>
+              <a:t>Data yang </a:t>
+            </a:r>
+            <a:r>
+              <a:rPr lang="en-ID" dirty="0" err="1" smtClean="0"/>
+              <a:t>digunakan</a:t>
+            </a:r>
+            <a:r>
+              <a:rPr lang="en-ID" dirty="0" smtClean="0"/>
+              <a:t> </a:t>
+            </a:r>
+            <a:r>
+              <a:rPr lang="en-ID" dirty="0" err="1" smtClean="0"/>
+              <a:t>adalah</a:t>
+            </a:r>
+            <a:r>
+              <a:rPr lang="en-ID" dirty="0" smtClean="0"/>
+              <a:t> data </a:t>
+            </a:r>
+            <a:r>
+              <a:rPr lang="en-ID" dirty="0" err="1" smtClean="0"/>
+              <a:t>jumlah</a:t>
+            </a:r>
+            <a:r>
+              <a:rPr lang="en-ID" dirty="0" smtClean="0"/>
+              <a:t> </a:t>
+            </a:r>
+            <a:r>
+              <a:rPr lang="en-ID" dirty="0" err="1" smtClean="0"/>
+              <a:t>kematian</a:t>
+            </a:r>
+            <a:r>
+              <a:rPr lang="en-ID" dirty="0" smtClean="0"/>
+              <a:t> </a:t>
+            </a:r>
+            <a:r>
+              <a:rPr lang="en-ID" dirty="0" err="1" smtClean="0"/>
+              <a:t>sampai</a:t>
+            </a:r>
+            <a:r>
+              <a:rPr lang="en-ID" dirty="0" smtClean="0"/>
+              <a:t> </a:t>
+            </a:r>
+            <a:r>
+              <a:rPr lang="en-ID" dirty="0" err="1" smtClean="0"/>
+              <a:t>tanggal</a:t>
+            </a:r>
+            <a:r>
+              <a:rPr lang="en-ID" dirty="0" smtClean="0"/>
+              <a:t> 22 </a:t>
+            </a:r>
+            <a:r>
+              <a:rPr lang="en-ID" dirty="0" err="1" smtClean="0"/>
+              <a:t>Maret</a:t>
+            </a:r>
+            <a:r>
+              <a:rPr lang="en-ID" dirty="0" smtClean="0"/>
+              <a:t> 2020</a:t>
+            </a:r>
+          </a:p>
+        </p:txBody>
+      </p:sp>
     </p:spTree>
     <p:extLst>
       <p:ext uri="{BB962C8B-B14F-4D97-AF65-F5344CB8AC3E}">
@@ -5742,7 +6258,15 @@
           <a:p>
             <a:r>
               <a:rPr lang="en-US" dirty="0" err="1" smtClean="0"/>
-              <a:t>Diskusi</a:t>
+              <a:t>Hasil</a:t>
+            </a:r>
+            <a:r>
+              <a:rPr lang="en-US" dirty="0"/>
+              <a:t> </a:t>
+            </a:r>
+            <a:r>
+              <a:rPr lang="en-US" dirty="0" err="1" smtClean="0"/>
+              <a:t>prediksi</a:t>
             </a:r>
             <a:r>
               <a:rPr lang="en-US" dirty="0" smtClean="0"/>
@@ -5750,258 +6274,832 @@
             </a:r>
             <a:r>
               <a:rPr lang="en-US" dirty="0" err="1" smtClean="0"/>
-              <a:t>tentang</a:t>
+              <a:t>dengan</a:t>
             </a:r>
             <a:r>
               <a:rPr lang="en-US" dirty="0" smtClean="0"/>
-              <a:t> </a:t>
+              <a:t> data 30 </a:t>
             </a:r>
             <a:r>
               <a:rPr lang="en-US" dirty="0" err="1" smtClean="0"/>
-              <a:t>hasil</a:t>
+              <a:t>Maret</a:t>
+            </a:r>
+            <a:r>
+              <a:rPr lang="en-US" dirty="0" smtClean="0"/>
+              <a:t> 2020</a:t>
             </a:r>
             <a:endParaRPr lang="en-US" dirty="0" smtClean="0"/>
           </a:p>
         </p:txBody>
       </p:sp>
-      <p:sp>
-        <p:nvSpPr>
-          <p:cNvPr id="3" name="Content Placeholder 2"/>
-          <p:cNvSpPr>
-            <a:spLocks noGrp="1"/>
-          </p:cNvSpPr>
+      <p:graphicFrame>
+        <p:nvGraphicFramePr>
+          <p:cNvPr id="4" name="Content Placeholder 3"/>
+          <p:cNvGraphicFramePr>
+            <a:graphicFrameLocks noGrp="1"/>
+          </p:cNvGraphicFramePr>
           <p:nvPr>
             <p:ph idx="1"/>
-          </p:nvPr>
-        </p:nvSpPr>
-        <p:spPr/>
-        <p:txBody>
-          <a:bodyPr/>
-          <a:lstStyle/>
-          <a:p>
-            <a:r>
-              <a:rPr lang="en-ID" dirty="0" smtClean="0"/>
-              <a:t>Model </a:t>
-            </a:r>
-            <a:r>
-              <a:rPr lang="en-ID" dirty="0" err="1" smtClean="0"/>
-              <a:t>tidak</a:t>
-            </a:r>
-            <a:r>
-              <a:rPr lang="en-ID" dirty="0" smtClean="0"/>
-              <a:t> </a:t>
-            </a:r>
-            <a:r>
-              <a:rPr lang="en-ID" dirty="0" err="1" smtClean="0"/>
-              <a:t>bisa</a:t>
-            </a:r>
-            <a:r>
-              <a:rPr lang="en-ID" dirty="0" smtClean="0"/>
-              <a:t> </a:t>
-            </a:r>
-            <a:r>
-              <a:rPr lang="en-ID" dirty="0" err="1" smtClean="0"/>
-              <a:t>memprediksi</a:t>
-            </a:r>
-            <a:r>
-              <a:rPr lang="en-ID" dirty="0" smtClean="0"/>
-              <a:t> </a:t>
-            </a:r>
-            <a:r>
-              <a:rPr lang="en-ID" dirty="0" err="1" smtClean="0"/>
-              <a:t>dengan</a:t>
-            </a:r>
-            <a:r>
-              <a:rPr lang="en-ID" dirty="0" smtClean="0"/>
-              <a:t> </a:t>
-            </a:r>
-            <a:r>
-              <a:rPr lang="en-ID" dirty="0" err="1" smtClean="0"/>
-              <a:t>tepat</a:t>
-            </a:r>
-            <a:r>
-              <a:rPr lang="en-ID" dirty="0" smtClean="0"/>
-              <a:t> </a:t>
-            </a:r>
-            <a:r>
-              <a:rPr lang="en-ID" dirty="0" err="1" smtClean="0"/>
-              <a:t>karena</a:t>
-            </a:r>
-            <a:r>
-              <a:rPr lang="en-ID" dirty="0" smtClean="0"/>
-              <a:t> </a:t>
-            </a:r>
-            <a:r>
-              <a:rPr lang="en-ID" dirty="0" err="1" smtClean="0"/>
-              <a:t>pada</a:t>
-            </a:r>
-            <a:r>
-              <a:rPr lang="en-ID" dirty="0" smtClean="0"/>
-              <a:t> </a:t>
-            </a:r>
-            <a:r>
-              <a:rPr lang="en-ID" dirty="0" err="1" smtClean="0"/>
-              <a:t>sekitar</a:t>
-            </a:r>
-            <a:r>
-              <a:rPr lang="en-ID" dirty="0" smtClean="0"/>
-              <a:t> </a:t>
-            </a:r>
-            <a:r>
-              <a:rPr lang="en-ID" dirty="0" err="1" smtClean="0"/>
-              <a:t>tanggal</a:t>
-            </a:r>
-            <a:r>
-              <a:rPr lang="en-ID" dirty="0" smtClean="0"/>
-              <a:t> 27 </a:t>
-            </a:r>
-            <a:r>
-              <a:rPr lang="en-ID" dirty="0" err="1" smtClean="0"/>
-              <a:t>Maret</a:t>
-            </a:r>
-            <a:r>
-              <a:rPr lang="en-ID" dirty="0" smtClean="0"/>
-              <a:t> 2020, </a:t>
-            </a:r>
-            <a:r>
-              <a:rPr lang="en-ID" dirty="0" err="1" smtClean="0"/>
-              <a:t>terjadi</a:t>
-            </a:r>
-            <a:r>
-              <a:rPr lang="en-ID" dirty="0" smtClean="0"/>
-              <a:t> </a:t>
-            </a:r>
-            <a:r>
-              <a:rPr lang="en-ID" dirty="0" err="1" smtClean="0"/>
-              <a:t>peningkatan</a:t>
-            </a:r>
-            <a:r>
-              <a:rPr lang="en-ID" dirty="0" smtClean="0"/>
-              <a:t> </a:t>
-            </a:r>
-            <a:r>
-              <a:rPr lang="en-ID" dirty="0" err="1" smtClean="0"/>
-              <a:t>jumlah</a:t>
-            </a:r>
-            <a:r>
-              <a:rPr lang="en-ID" dirty="0" smtClean="0"/>
-              <a:t> </a:t>
-            </a:r>
-            <a:r>
-              <a:rPr lang="en-ID" dirty="0" err="1" smtClean="0"/>
-              <a:t>kasus</a:t>
-            </a:r>
-            <a:r>
-              <a:rPr lang="en-ID" dirty="0" smtClean="0"/>
-              <a:t> yang </a:t>
-            </a:r>
-            <a:r>
-              <a:rPr lang="en-ID" dirty="0" err="1" smtClean="0"/>
-              <a:t>cukup</a:t>
-            </a:r>
-            <a:r>
-              <a:rPr lang="en-ID" dirty="0" smtClean="0"/>
-              <a:t> </a:t>
-            </a:r>
-            <a:r>
-              <a:rPr lang="en-ID" dirty="0" err="1" smtClean="0"/>
-              <a:t>signifikan</a:t>
-            </a:r>
-            <a:r>
-              <a:rPr lang="en-ID" dirty="0" smtClean="0"/>
-              <a:t> </a:t>
-            </a:r>
-            <a:r>
-              <a:rPr lang="en-ID" dirty="0" err="1" smtClean="0"/>
-              <a:t>akibat</a:t>
-            </a:r>
-            <a:r>
-              <a:rPr lang="en-ID" dirty="0" smtClean="0"/>
-              <a:t> </a:t>
-            </a:r>
-            <a:r>
-              <a:rPr lang="en-ID" dirty="0" err="1" smtClean="0"/>
-              <a:t>diadakan</a:t>
-            </a:r>
-            <a:r>
-              <a:rPr lang="en-ID" dirty="0" smtClean="0"/>
-              <a:t> rapid test di </a:t>
-            </a:r>
-            <a:r>
-              <a:rPr lang="en-ID" dirty="0" err="1" smtClean="0"/>
-              <a:t>beberapa</a:t>
-            </a:r>
-            <a:r>
-              <a:rPr lang="en-ID" dirty="0" smtClean="0"/>
-              <a:t> </a:t>
-            </a:r>
-            <a:r>
-              <a:rPr lang="en-ID" dirty="0" err="1" smtClean="0"/>
-              <a:t>daerah</a:t>
-            </a:r>
-            <a:endParaRPr lang="en-ID" dirty="0" smtClean="0"/>
-          </a:p>
-          <a:p>
-            <a:r>
-              <a:rPr lang="en-ID" dirty="0" smtClean="0"/>
-              <a:t>Data yang </a:t>
-            </a:r>
-            <a:r>
-              <a:rPr lang="en-ID" dirty="0" err="1" smtClean="0"/>
-              <a:t>digunakan</a:t>
-            </a:r>
-            <a:r>
-              <a:rPr lang="en-ID" dirty="0" smtClean="0"/>
-              <a:t> </a:t>
-            </a:r>
-            <a:r>
-              <a:rPr lang="en-ID" dirty="0" err="1" smtClean="0"/>
-              <a:t>untuk</a:t>
-            </a:r>
-            <a:r>
-              <a:rPr lang="en-ID" dirty="0" smtClean="0"/>
-              <a:t> </a:t>
-            </a:r>
-            <a:r>
-              <a:rPr lang="en-ID" dirty="0" err="1" smtClean="0"/>
-              <a:t>membuat</a:t>
-            </a:r>
-            <a:r>
-              <a:rPr lang="en-ID" dirty="0" smtClean="0"/>
-              <a:t> model </a:t>
-            </a:r>
-            <a:r>
-              <a:rPr lang="en-ID" dirty="0" err="1" smtClean="0"/>
-              <a:t>adalah</a:t>
-            </a:r>
-            <a:r>
-              <a:rPr lang="en-ID" dirty="0" smtClean="0"/>
-              <a:t> data </a:t>
-            </a:r>
-            <a:r>
-              <a:rPr lang="en-ID" dirty="0" err="1" smtClean="0"/>
-              <a:t>sebelum</a:t>
-            </a:r>
-            <a:r>
-              <a:rPr lang="en-ID" dirty="0" smtClean="0"/>
-              <a:t> </a:t>
-            </a:r>
-            <a:r>
-              <a:rPr lang="en-ID" dirty="0" err="1" smtClean="0"/>
-              <a:t>adanya</a:t>
-            </a:r>
-            <a:r>
-              <a:rPr lang="en-ID" dirty="0" smtClean="0"/>
-              <a:t> rapid test </a:t>
-            </a:r>
-            <a:endParaRPr lang="en-US" dirty="0"/>
-          </a:p>
-        </p:txBody>
-      </p:sp>
+            <p:extLst>
+              <p:ext uri="{D42A27DB-BD31-4B8C-83A1-F6EECF244321}">
+                <p14:modId xmlns:p14="http://schemas.microsoft.com/office/powerpoint/2010/main" val="3331056190"/>
+              </p:ext>
+            </p:extLst>
+          </p:nvPr>
+        </p:nvGraphicFramePr>
+        <p:xfrm>
+          <a:off x="1131912" y="1690688"/>
+          <a:ext cx="7786686" cy="3708400"/>
+        </p:xfrm>
+        <a:graphic>
+          <a:graphicData uri="http://schemas.openxmlformats.org/drawingml/2006/table">
+            <a:tbl>
+              <a:tblPr firstRow="1" bandRow="1">
+                <a:tableStyleId>{5C22544A-7EE6-4342-B048-85BDC9FD1C3A}</a:tableStyleId>
+              </a:tblPr>
+              <a:tblGrid>
+                <a:gridCol w="522201"/>
+                <a:gridCol w="1756111"/>
+                <a:gridCol w="2754187"/>
+                <a:gridCol w="2754187"/>
+              </a:tblGrid>
+              <a:tr h="370840">
+                <a:tc>
+                  <a:txBody>
+                    <a:bodyPr/>
+                    <a:lstStyle/>
+                    <a:p>
+                      <a:pPr algn="ctr"/>
+                      <a:r>
+                        <a:rPr lang="en-ID" dirty="0" smtClean="0"/>
+                        <a:t>No</a:t>
+                      </a:r>
+                      <a:endParaRPr lang="en-US" dirty="0"/>
+                    </a:p>
+                  </a:txBody>
+                  <a:tcPr/>
+                </a:tc>
+                <a:tc>
+                  <a:txBody>
+                    <a:bodyPr/>
+                    <a:lstStyle/>
+                    <a:p>
+                      <a:pPr algn="ctr"/>
+                      <a:r>
+                        <a:rPr lang="en-ID" dirty="0" err="1" smtClean="0"/>
+                        <a:t>Tanggal</a:t>
+                      </a:r>
+                      <a:endParaRPr lang="en-US" dirty="0"/>
+                    </a:p>
+                  </a:txBody>
+                  <a:tcPr/>
+                </a:tc>
+                <a:tc>
+                  <a:txBody>
+                    <a:bodyPr/>
+                    <a:lstStyle/>
+                    <a:p>
+                      <a:pPr algn="ctr"/>
+                      <a:r>
+                        <a:rPr lang="en-ID" dirty="0" err="1" smtClean="0"/>
+                        <a:t>Prediksi</a:t>
+                      </a:r>
+                      <a:r>
+                        <a:rPr lang="en-ID" dirty="0" smtClean="0"/>
+                        <a:t> </a:t>
+                      </a:r>
+                      <a:r>
+                        <a:rPr lang="en-ID" dirty="0" smtClean="0"/>
+                        <a:t>Logistic Model</a:t>
+                      </a:r>
+                      <a:endParaRPr lang="en-US" dirty="0"/>
+                    </a:p>
+                  </a:txBody>
+                  <a:tcPr/>
+                </a:tc>
+                <a:tc>
+                  <a:txBody>
+                    <a:bodyPr/>
+                    <a:lstStyle/>
+                    <a:p>
+                      <a:pPr algn="ctr"/>
+                      <a:r>
+                        <a:rPr lang="en-ID" dirty="0" err="1" smtClean="0"/>
+                        <a:t>Prediksi</a:t>
+                      </a:r>
+                      <a:r>
+                        <a:rPr lang="en-ID" dirty="0" smtClean="0"/>
+                        <a:t> </a:t>
+                      </a:r>
+                      <a:r>
+                        <a:rPr lang="en-ID" dirty="0" err="1" smtClean="0"/>
+                        <a:t>FBProphet</a:t>
+                      </a:r>
+                      <a:endParaRPr lang="en-US" dirty="0"/>
+                    </a:p>
+                  </a:txBody>
+                  <a:tcPr/>
+                </a:tc>
+              </a:tr>
+              <a:tr h="370840">
+                <a:tc>
+                  <a:txBody>
+                    <a:bodyPr/>
+                    <a:lstStyle/>
+                    <a:p>
+                      <a:pPr algn="ctr"/>
+                      <a:r>
+                        <a:rPr lang="en-ID" dirty="0" smtClean="0"/>
+                        <a:t>1</a:t>
+                      </a:r>
+                      <a:endParaRPr lang="en-US" dirty="0"/>
+                    </a:p>
+                  </a:txBody>
+                  <a:tcPr/>
+                </a:tc>
+                <a:tc>
+                  <a:txBody>
+                    <a:bodyPr/>
+                    <a:lstStyle/>
+                    <a:p>
+                      <a:pPr algn="ctr"/>
+                      <a:r>
+                        <a:rPr lang="en-ID" dirty="0" smtClean="0"/>
+                        <a:t>31 </a:t>
+                      </a:r>
+                      <a:r>
+                        <a:rPr lang="en-ID" dirty="0" err="1" smtClean="0"/>
+                        <a:t>Maret</a:t>
+                      </a:r>
+                      <a:r>
+                        <a:rPr lang="en-ID" baseline="0" dirty="0" smtClean="0"/>
+                        <a:t> 2020</a:t>
+                      </a:r>
+                      <a:endParaRPr lang="en-US" dirty="0"/>
+                    </a:p>
+                  </a:txBody>
+                  <a:tcPr/>
+                </a:tc>
+                <a:tc>
+                  <a:txBody>
+                    <a:bodyPr/>
+                    <a:lstStyle/>
+                    <a:p>
+                      <a:pPr algn="ctr"/>
+                      <a:r>
+                        <a:rPr lang="en-ID" dirty="0" smtClean="0"/>
+                        <a:t>134</a:t>
+                      </a:r>
+                      <a:endParaRPr lang="en-US" dirty="0"/>
+                    </a:p>
+                  </a:txBody>
+                  <a:tcPr/>
+                </a:tc>
+                <a:tc>
+                  <a:txBody>
+                    <a:bodyPr/>
+                    <a:lstStyle/>
+                    <a:p>
+                      <a:pPr algn="ctr"/>
+                      <a:r>
+                        <a:rPr lang="en-ID" dirty="0" smtClean="0"/>
+                        <a:t>135</a:t>
+                      </a:r>
+                      <a:endParaRPr lang="en-US" dirty="0"/>
+                    </a:p>
+                  </a:txBody>
+                  <a:tcPr/>
+                </a:tc>
+              </a:tr>
+              <a:tr h="370840">
+                <a:tc>
+                  <a:txBody>
+                    <a:bodyPr/>
+                    <a:lstStyle/>
+                    <a:p>
+                      <a:pPr algn="ctr"/>
+                      <a:r>
+                        <a:rPr lang="en-ID" dirty="0" smtClean="0"/>
+                        <a:t>2</a:t>
+                      </a:r>
+                      <a:endParaRPr lang="en-US" dirty="0"/>
+                    </a:p>
+                  </a:txBody>
+                  <a:tcPr/>
+                </a:tc>
+                <a:tc>
+                  <a:txBody>
+                    <a:bodyPr/>
+                    <a:lstStyle/>
+                    <a:p>
+                      <a:pPr algn="ctr"/>
+                      <a:r>
+                        <a:rPr lang="en-ID" dirty="0" smtClean="0"/>
+                        <a:t>1 April</a:t>
+                      </a:r>
+                      <a:r>
+                        <a:rPr lang="en-ID" baseline="0" dirty="0" smtClean="0"/>
+                        <a:t> </a:t>
+                      </a:r>
+                      <a:r>
+                        <a:rPr lang="en-ID" baseline="0" dirty="0" smtClean="0"/>
+                        <a:t>2020</a:t>
+                      </a:r>
+                      <a:endParaRPr lang="en-US" dirty="0"/>
+                    </a:p>
+                  </a:txBody>
+                  <a:tcPr/>
+                </a:tc>
+                <a:tc>
+                  <a:txBody>
+                    <a:bodyPr/>
+                    <a:lstStyle/>
+                    <a:p>
+                      <a:pPr algn="ctr"/>
+                      <a:r>
+                        <a:rPr lang="en-ID" dirty="0" smtClean="0"/>
+                        <a:t>144</a:t>
+                      </a:r>
+                      <a:endParaRPr lang="en-US" dirty="0"/>
+                    </a:p>
+                  </a:txBody>
+                  <a:tcPr/>
+                </a:tc>
+                <a:tc>
+                  <a:txBody>
+                    <a:bodyPr/>
+                    <a:lstStyle/>
+                    <a:p>
+                      <a:pPr algn="ctr"/>
+                      <a:r>
+                        <a:rPr lang="en-ID" dirty="0" smtClean="0"/>
+                        <a:t>146</a:t>
+                      </a:r>
+                      <a:endParaRPr lang="en-US" dirty="0"/>
+                    </a:p>
+                  </a:txBody>
+                  <a:tcPr/>
+                </a:tc>
+              </a:tr>
+              <a:tr h="370840">
+                <a:tc>
+                  <a:txBody>
+                    <a:bodyPr/>
+                    <a:lstStyle/>
+                    <a:p>
+                      <a:pPr algn="ctr"/>
+                      <a:r>
+                        <a:rPr lang="en-ID" dirty="0" smtClean="0"/>
+                        <a:t>3</a:t>
+                      </a:r>
+                      <a:endParaRPr lang="en-US" dirty="0"/>
+                    </a:p>
+                  </a:txBody>
+                  <a:tcPr/>
+                </a:tc>
+                <a:tc>
+                  <a:txBody>
+                    <a:bodyPr/>
+                    <a:lstStyle/>
+                    <a:p>
+                      <a:pPr algn="ctr"/>
+                      <a:r>
+                        <a:rPr lang="en-ID" dirty="0" smtClean="0"/>
+                        <a:t>2 April</a:t>
+                      </a:r>
+                      <a:r>
+                        <a:rPr lang="en-ID" baseline="0" dirty="0" smtClean="0"/>
+                        <a:t> 2020</a:t>
+                      </a:r>
+                      <a:endParaRPr lang="en-US" dirty="0"/>
+                    </a:p>
+                  </a:txBody>
+                  <a:tcPr/>
+                </a:tc>
+                <a:tc>
+                  <a:txBody>
+                    <a:bodyPr/>
+                    <a:lstStyle/>
+                    <a:p>
+                      <a:pPr algn="ctr"/>
+                      <a:r>
+                        <a:rPr lang="en-ID" dirty="0" smtClean="0"/>
+                        <a:t>153</a:t>
+                      </a:r>
+                      <a:endParaRPr lang="en-US" dirty="0"/>
+                    </a:p>
+                  </a:txBody>
+                  <a:tcPr/>
+                </a:tc>
+                <a:tc>
+                  <a:txBody>
+                    <a:bodyPr/>
+                    <a:lstStyle/>
+                    <a:p>
+                      <a:pPr algn="ctr"/>
+                      <a:r>
+                        <a:rPr lang="en-ID" dirty="0" smtClean="0"/>
+                        <a:t>157</a:t>
+                      </a:r>
+                      <a:endParaRPr lang="en-US" dirty="0"/>
+                    </a:p>
+                  </a:txBody>
+                  <a:tcPr/>
+                </a:tc>
+              </a:tr>
+              <a:tr h="370840">
+                <a:tc>
+                  <a:txBody>
+                    <a:bodyPr/>
+                    <a:lstStyle/>
+                    <a:p>
+                      <a:pPr algn="ctr"/>
+                      <a:r>
+                        <a:rPr lang="en-ID" dirty="0" smtClean="0"/>
+                        <a:t>4</a:t>
+                      </a:r>
+                      <a:endParaRPr lang="en-US" dirty="0"/>
+                    </a:p>
+                  </a:txBody>
+                  <a:tcPr/>
+                </a:tc>
+                <a:tc>
+                  <a:txBody>
+                    <a:bodyPr/>
+                    <a:lstStyle/>
+                    <a:p>
+                      <a:pPr algn="ctr"/>
+                      <a:r>
+                        <a:rPr lang="en-ID" dirty="0" smtClean="0"/>
+                        <a:t>3 April</a:t>
+                      </a:r>
+                      <a:r>
+                        <a:rPr lang="en-ID" baseline="0" dirty="0" smtClean="0"/>
+                        <a:t> 2020</a:t>
+                      </a:r>
+                      <a:endParaRPr lang="en-US" dirty="0"/>
+                    </a:p>
+                  </a:txBody>
+                  <a:tcPr/>
+                </a:tc>
+                <a:tc>
+                  <a:txBody>
+                    <a:bodyPr/>
+                    <a:lstStyle/>
+                    <a:p>
+                      <a:pPr algn="ctr"/>
+                      <a:r>
+                        <a:rPr lang="en-ID" dirty="0" smtClean="0"/>
+                        <a:t>162</a:t>
+                      </a:r>
+                      <a:endParaRPr lang="en-US" dirty="0"/>
+                    </a:p>
+                  </a:txBody>
+                  <a:tcPr/>
+                </a:tc>
+                <a:tc>
+                  <a:txBody>
+                    <a:bodyPr/>
+                    <a:lstStyle/>
+                    <a:p>
+                      <a:pPr algn="ctr"/>
+                      <a:r>
+                        <a:rPr lang="en-ID" dirty="0" smtClean="0"/>
+                        <a:t>168</a:t>
+                      </a:r>
+                      <a:endParaRPr lang="en-US" dirty="0"/>
+                    </a:p>
+                  </a:txBody>
+                  <a:tcPr/>
+                </a:tc>
+              </a:tr>
+              <a:tr h="370840">
+                <a:tc>
+                  <a:txBody>
+                    <a:bodyPr/>
+                    <a:lstStyle/>
+                    <a:p>
+                      <a:pPr algn="ctr"/>
+                      <a:r>
+                        <a:rPr lang="en-ID" dirty="0" smtClean="0"/>
+                        <a:t>5</a:t>
+                      </a:r>
+                      <a:endParaRPr lang="en-US" dirty="0"/>
+                    </a:p>
+                  </a:txBody>
+                  <a:tcPr/>
+                </a:tc>
+                <a:tc>
+                  <a:txBody>
+                    <a:bodyPr/>
+                    <a:lstStyle/>
+                    <a:p>
+                      <a:pPr algn="ctr"/>
+                      <a:r>
+                        <a:rPr lang="en-ID" dirty="0" smtClean="0"/>
+                        <a:t>4 April</a:t>
+                      </a:r>
+                      <a:r>
+                        <a:rPr lang="en-ID" baseline="0" dirty="0" smtClean="0"/>
+                        <a:t> 2020</a:t>
+                      </a:r>
+                      <a:endParaRPr lang="en-US" dirty="0"/>
+                    </a:p>
+                  </a:txBody>
+                  <a:tcPr/>
+                </a:tc>
+                <a:tc>
+                  <a:txBody>
+                    <a:bodyPr/>
+                    <a:lstStyle/>
+                    <a:p>
+                      <a:pPr algn="ctr"/>
+                      <a:r>
+                        <a:rPr lang="en-ID" dirty="0" smtClean="0"/>
+                        <a:t>169</a:t>
+                      </a:r>
+                      <a:endParaRPr lang="en-US" dirty="0"/>
+                    </a:p>
+                  </a:txBody>
+                  <a:tcPr/>
+                </a:tc>
+                <a:tc>
+                  <a:txBody>
+                    <a:bodyPr/>
+                    <a:lstStyle/>
+                    <a:p>
+                      <a:pPr algn="ctr"/>
+                      <a:r>
+                        <a:rPr lang="en-ID" dirty="0" smtClean="0"/>
+                        <a:t>179</a:t>
+                      </a:r>
+                      <a:endParaRPr lang="en-US" dirty="0"/>
+                    </a:p>
+                  </a:txBody>
+                  <a:tcPr/>
+                </a:tc>
+              </a:tr>
+              <a:tr h="370840">
+                <a:tc>
+                  <a:txBody>
+                    <a:bodyPr/>
+                    <a:lstStyle/>
+                    <a:p>
+                      <a:pPr algn="ctr"/>
+                      <a:r>
+                        <a:rPr lang="en-ID" dirty="0" smtClean="0"/>
+                        <a:t>6</a:t>
+                      </a:r>
+                      <a:endParaRPr lang="en-US" dirty="0"/>
+                    </a:p>
+                  </a:txBody>
+                  <a:tcPr/>
+                </a:tc>
+                <a:tc>
+                  <a:txBody>
+                    <a:bodyPr/>
+                    <a:lstStyle/>
+                    <a:p>
+                      <a:pPr algn="ctr"/>
+                      <a:r>
+                        <a:rPr lang="en-ID" dirty="0" smtClean="0"/>
+                        <a:t>5 April</a:t>
+                      </a:r>
+                      <a:r>
+                        <a:rPr lang="en-ID" baseline="0" dirty="0" smtClean="0"/>
+                        <a:t> 2020</a:t>
+                      </a:r>
+                      <a:endParaRPr lang="en-US" dirty="0"/>
+                    </a:p>
+                  </a:txBody>
+                  <a:tcPr/>
+                </a:tc>
+                <a:tc>
+                  <a:txBody>
+                    <a:bodyPr/>
+                    <a:lstStyle/>
+                    <a:p>
+                      <a:pPr algn="ctr"/>
+                      <a:r>
+                        <a:rPr lang="en-ID" dirty="0" smtClean="0"/>
+                        <a:t>175</a:t>
+                      </a:r>
+                      <a:endParaRPr lang="en-US" dirty="0"/>
+                    </a:p>
+                  </a:txBody>
+                  <a:tcPr/>
+                </a:tc>
+                <a:tc>
+                  <a:txBody>
+                    <a:bodyPr/>
+                    <a:lstStyle/>
+                    <a:p>
+                      <a:pPr algn="ctr"/>
+                      <a:r>
+                        <a:rPr lang="en-ID" dirty="0" smtClean="0"/>
+                        <a:t>190</a:t>
+                      </a:r>
+                      <a:endParaRPr lang="en-US" dirty="0"/>
+                    </a:p>
+                  </a:txBody>
+                  <a:tcPr/>
+                </a:tc>
+              </a:tr>
+              <a:tr h="370840">
+                <a:tc>
+                  <a:txBody>
+                    <a:bodyPr/>
+                    <a:lstStyle/>
+                    <a:p>
+                      <a:pPr algn="ctr"/>
+                      <a:r>
+                        <a:rPr lang="en-ID" dirty="0" smtClean="0"/>
+                        <a:t>7</a:t>
+                      </a:r>
+                      <a:endParaRPr lang="en-US" dirty="0"/>
+                    </a:p>
+                  </a:txBody>
+                  <a:tcPr/>
+                </a:tc>
+                <a:tc>
+                  <a:txBody>
+                    <a:bodyPr/>
+                    <a:lstStyle/>
+                    <a:p>
+                      <a:pPr algn="ctr"/>
+                      <a:r>
+                        <a:rPr lang="en-ID" dirty="0" smtClean="0"/>
+                        <a:t>6 April</a:t>
+                      </a:r>
+                      <a:r>
+                        <a:rPr lang="en-ID" baseline="0" dirty="0" smtClean="0"/>
+                        <a:t> 2020</a:t>
+                      </a:r>
+                      <a:endParaRPr lang="en-US" dirty="0"/>
+                    </a:p>
+                  </a:txBody>
+                  <a:tcPr/>
+                </a:tc>
+                <a:tc>
+                  <a:txBody>
+                    <a:bodyPr/>
+                    <a:lstStyle/>
+                    <a:p>
+                      <a:pPr algn="ctr"/>
+                      <a:r>
+                        <a:rPr lang="en-ID" dirty="0" smtClean="0"/>
+                        <a:t>181</a:t>
+                      </a:r>
+                      <a:endParaRPr lang="en-US" dirty="0"/>
+                    </a:p>
+                  </a:txBody>
+                  <a:tcPr/>
+                </a:tc>
+                <a:tc>
+                  <a:txBody>
+                    <a:bodyPr/>
+                    <a:lstStyle/>
+                    <a:p>
+                      <a:pPr algn="ctr"/>
+                      <a:r>
+                        <a:rPr lang="en-ID" dirty="0" smtClean="0"/>
+                        <a:t>201</a:t>
+                      </a:r>
+                      <a:endParaRPr lang="en-US" dirty="0"/>
+                    </a:p>
+                  </a:txBody>
+                  <a:tcPr/>
+                </a:tc>
+              </a:tr>
+              <a:tr h="370840">
+                <a:tc>
+                  <a:txBody>
+                    <a:bodyPr/>
+                    <a:lstStyle/>
+                    <a:p>
+                      <a:pPr algn="ctr"/>
+                      <a:r>
+                        <a:rPr lang="en-ID" dirty="0" smtClean="0"/>
+                        <a:t>8</a:t>
+                      </a:r>
+                      <a:endParaRPr lang="en-US" dirty="0"/>
+                    </a:p>
+                  </a:txBody>
+                  <a:tcPr/>
+                </a:tc>
+                <a:tc>
+                  <a:txBody>
+                    <a:bodyPr/>
+                    <a:lstStyle/>
+                    <a:p>
+                      <a:pPr algn="ctr"/>
+                      <a:r>
+                        <a:rPr lang="en-ID" dirty="0" smtClean="0"/>
+                        <a:t>7 April</a:t>
+                      </a:r>
+                      <a:r>
+                        <a:rPr lang="en-ID" baseline="0" dirty="0" smtClean="0"/>
+                        <a:t> 2020</a:t>
+                      </a:r>
+                      <a:endParaRPr lang="en-US" dirty="0"/>
+                    </a:p>
+                  </a:txBody>
+                  <a:tcPr/>
+                </a:tc>
+                <a:tc>
+                  <a:txBody>
+                    <a:bodyPr/>
+                    <a:lstStyle/>
+                    <a:p>
+                      <a:pPr algn="ctr"/>
+                      <a:r>
+                        <a:rPr lang="en-ID" dirty="0" smtClean="0"/>
+                        <a:t>185</a:t>
+                      </a:r>
+                      <a:endParaRPr lang="en-US" dirty="0"/>
+                    </a:p>
+                  </a:txBody>
+                  <a:tcPr/>
+                </a:tc>
+                <a:tc>
+                  <a:txBody>
+                    <a:bodyPr/>
+                    <a:lstStyle/>
+                    <a:p>
+                      <a:pPr algn="ctr"/>
+                      <a:r>
+                        <a:rPr lang="en-ID" dirty="0" smtClean="0"/>
+                        <a:t>212</a:t>
+                      </a:r>
+                      <a:endParaRPr lang="en-US" dirty="0"/>
+                    </a:p>
+                  </a:txBody>
+                  <a:tcPr/>
+                </a:tc>
+              </a:tr>
+              <a:tr h="370840">
+                <a:tc>
+                  <a:txBody>
+                    <a:bodyPr/>
+                    <a:lstStyle/>
+                    <a:p>
+                      <a:pPr algn="ctr"/>
+                      <a:r>
+                        <a:rPr lang="en-ID" dirty="0" smtClean="0"/>
+                        <a:t>9</a:t>
+                      </a:r>
+                      <a:endParaRPr lang="en-US" dirty="0"/>
+                    </a:p>
+                  </a:txBody>
+                  <a:tcPr/>
+                </a:tc>
+                <a:tc>
+                  <a:txBody>
+                    <a:bodyPr/>
+                    <a:lstStyle/>
+                    <a:p>
+                      <a:pPr algn="ctr"/>
+                      <a:r>
+                        <a:rPr lang="en-ID" dirty="0" smtClean="0"/>
+                        <a:t>8 April</a:t>
+                      </a:r>
+                      <a:r>
+                        <a:rPr lang="en-ID" baseline="0" dirty="0" smtClean="0"/>
+                        <a:t> 2020</a:t>
+                      </a:r>
+                      <a:endParaRPr lang="en-US" dirty="0"/>
+                    </a:p>
+                  </a:txBody>
+                  <a:tcPr/>
+                </a:tc>
+                <a:tc>
+                  <a:txBody>
+                    <a:bodyPr/>
+                    <a:lstStyle/>
+                    <a:p>
+                      <a:pPr algn="ctr"/>
+                      <a:r>
+                        <a:rPr lang="en-ID" dirty="0" smtClean="0"/>
+                        <a:t>189</a:t>
+                      </a:r>
+                      <a:endParaRPr lang="en-US" dirty="0"/>
+                    </a:p>
+                  </a:txBody>
+                  <a:tcPr/>
+                </a:tc>
+                <a:tc>
+                  <a:txBody>
+                    <a:bodyPr/>
+                    <a:lstStyle/>
+                    <a:p>
+                      <a:pPr algn="ctr"/>
+                      <a:r>
+                        <a:rPr lang="en-ID" dirty="0" smtClean="0"/>
+                        <a:t>223</a:t>
+                      </a:r>
+                      <a:endParaRPr lang="en-US" dirty="0"/>
+                    </a:p>
+                  </a:txBody>
+                  <a:tcPr/>
+                </a:tc>
+              </a:tr>
+            </a:tbl>
+          </a:graphicData>
+        </a:graphic>
+      </p:graphicFrame>
+      <p:graphicFrame>
+        <p:nvGraphicFramePr>
+          <p:cNvPr id="5" name="Table 4"/>
+          <p:cNvGraphicFramePr>
+            <a:graphicFrameLocks noGrp="1"/>
+          </p:cNvGraphicFramePr>
+          <p:nvPr>
+            <p:extLst>
+              <p:ext uri="{D42A27DB-BD31-4B8C-83A1-F6EECF244321}">
+                <p14:modId xmlns:p14="http://schemas.microsoft.com/office/powerpoint/2010/main" val="3925014175"/>
+              </p:ext>
+            </p:extLst>
+          </p:nvPr>
+        </p:nvGraphicFramePr>
+        <p:xfrm>
+          <a:off x="9186861" y="1690688"/>
+          <a:ext cx="2435202" cy="1010920"/>
+        </p:xfrm>
+        <a:graphic>
+          <a:graphicData uri="http://schemas.openxmlformats.org/drawingml/2006/table">
+            <a:tbl>
+              <a:tblPr firstRow="1" bandRow="1">
+                <a:tableStyleId>{5C22544A-7EE6-4342-B048-85BDC9FD1C3A}</a:tableStyleId>
+              </a:tblPr>
+              <a:tblGrid>
+                <a:gridCol w="2435202"/>
+              </a:tblGrid>
+              <a:tr h="370840">
+                <a:tc>
+                  <a:txBody>
+                    <a:bodyPr/>
+                    <a:lstStyle/>
+                    <a:p>
+                      <a:pPr algn="ctr"/>
+                      <a:r>
+                        <a:rPr lang="en-ID" dirty="0" err="1" smtClean="0"/>
+                        <a:t>Prediksi</a:t>
+                      </a:r>
+                      <a:r>
+                        <a:rPr lang="en-ID" dirty="0" smtClean="0"/>
+                        <a:t> </a:t>
+                      </a:r>
+                      <a:r>
+                        <a:rPr lang="en-ID" dirty="0" err="1" smtClean="0"/>
+                        <a:t>Jumlah</a:t>
+                      </a:r>
+                      <a:r>
+                        <a:rPr lang="en-ID" dirty="0" smtClean="0"/>
+                        <a:t> </a:t>
+                      </a:r>
+                      <a:r>
+                        <a:rPr lang="en-ID" dirty="0" err="1" smtClean="0"/>
+                        <a:t>Kematian</a:t>
+                      </a:r>
+                      <a:r>
+                        <a:rPr lang="en-ID" dirty="0" smtClean="0"/>
+                        <a:t> </a:t>
+                      </a:r>
+                      <a:r>
+                        <a:rPr lang="en-ID" dirty="0" err="1" smtClean="0"/>
+                        <a:t>Maks</a:t>
+                      </a:r>
+                      <a:endParaRPr lang="en-US" dirty="0"/>
+                    </a:p>
+                  </a:txBody>
+                  <a:tcPr/>
+                </a:tc>
+              </a:tr>
+              <a:tr h="370840">
+                <a:tc>
+                  <a:txBody>
+                    <a:bodyPr/>
+                    <a:lstStyle/>
+                    <a:p>
+                      <a:pPr algn="ctr"/>
+                      <a:r>
+                        <a:rPr lang="en-ID" dirty="0" smtClean="0"/>
+                        <a:t>205</a:t>
+                      </a:r>
+                      <a:endParaRPr lang="en-US" dirty="0"/>
+                    </a:p>
+                  </a:txBody>
+                  <a:tcPr/>
+                </a:tc>
+              </a:tr>
+            </a:tbl>
+          </a:graphicData>
+        </a:graphic>
+      </p:graphicFrame>
     </p:spTree>
     <p:extLst>
       <p:ext uri="{BB962C8B-B14F-4D97-AF65-F5344CB8AC3E}">
-        <p14:creationId xmlns:p14="http://schemas.microsoft.com/office/powerpoint/2010/main" val="2792857039"/>
+        <p14:creationId xmlns:p14="http://schemas.microsoft.com/office/powerpoint/2010/main" val="463855894"/>
       </p:ext>
     </p:extLst>
   </p:cSld>
@@ -6044,12 +7142,16 @@
           <a:lstStyle/>
           <a:p>
             <a:r>
+              <a:rPr lang="en-US" dirty="0" err="1" smtClean="0"/>
+              <a:t>Diskusi</a:t>
+            </a:r>
+            <a:r>
               <a:rPr lang="en-US" dirty="0" smtClean="0"/>
-              <a:t>Cara </a:t>
+              <a:t> </a:t>
             </a:r>
             <a:r>
               <a:rPr lang="en-US" dirty="0" err="1" smtClean="0"/>
-              <a:t>mengkonfirmasi</a:t>
+              <a:t>tentang</a:t>
             </a:r>
             <a:r>
               <a:rPr lang="en-US" dirty="0" smtClean="0"/>
@@ -6057,13 +7159,9 @@
             </a:r>
             <a:r>
               <a:rPr lang="en-US" dirty="0" err="1" smtClean="0"/>
-              <a:t>hasi</a:t>
-            </a:r>
-            <a:r>
-              <a:rPr lang="en-US" dirty="0" err="1" smtClean="0"/>
-              <a:t>l</a:t>
-            </a:r>
-            <a:endParaRPr lang="en-US" dirty="0"/>
+              <a:t>hasil</a:t>
+            </a:r>
+            <a:endParaRPr lang="en-US" dirty="0" smtClean="0"/>
           </a:p>
         </p:txBody>
       </p:sp>
@@ -6083,8 +7181,199 @@
           <a:lstStyle/>
           <a:p>
             <a:r>
-              <a:rPr lang="en-ID" dirty="0" err="1" smtClean="0"/>
-              <a:t>Membandingkan</a:t>
+              <a:rPr lang="en-ID" dirty="0" smtClean="0"/>
+              <a:t>Model </a:t>
+            </a:r>
+            <a:r>
+              <a:rPr lang="en-ID" dirty="0" err="1" smtClean="0"/>
+              <a:t>tidak</a:t>
+            </a:r>
+            <a:r>
+              <a:rPr lang="en-ID" dirty="0" smtClean="0"/>
+              <a:t> </a:t>
+            </a:r>
+            <a:r>
+              <a:rPr lang="en-ID" dirty="0" err="1" smtClean="0"/>
+              <a:t>bisa</a:t>
+            </a:r>
+            <a:r>
+              <a:rPr lang="en-ID" dirty="0" smtClean="0"/>
+              <a:t> </a:t>
+            </a:r>
+            <a:r>
+              <a:rPr lang="en-ID" dirty="0" err="1" smtClean="0"/>
+              <a:t>memprediksi</a:t>
+            </a:r>
+            <a:r>
+              <a:rPr lang="en-ID" dirty="0" smtClean="0"/>
+              <a:t> </a:t>
+            </a:r>
+            <a:r>
+              <a:rPr lang="en-ID" dirty="0" err="1" smtClean="0"/>
+              <a:t>dengan</a:t>
+            </a:r>
+            <a:r>
+              <a:rPr lang="en-ID" dirty="0" smtClean="0"/>
+              <a:t> </a:t>
+            </a:r>
+            <a:r>
+              <a:rPr lang="en-ID" dirty="0" err="1" smtClean="0"/>
+              <a:t>tepat</a:t>
+            </a:r>
+            <a:r>
+              <a:rPr lang="en-ID" dirty="0" smtClean="0"/>
+              <a:t> </a:t>
+            </a:r>
+            <a:r>
+              <a:rPr lang="en-ID" dirty="0" err="1" smtClean="0"/>
+              <a:t>karena</a:t>
+            </a:r>
+            <a:r>
+              <a:rPr lang="en-ID" dirty="0" smtClean="0"/>
+              <a:t> </a:t>
+            </a:r>
+            <a:r>
+              <a:rPr lang="en-ID" dirty="0" err="1" smtClean="0"/>
+              <a:t>pada</a:t>
+            </a:r>
+            <a:r>
+              <a:rPr lang="en-ID" dirty="0" smtClean="0"/>
+              <a:t> </a:t>
+            </a:r>
+            <a:r>
+              <a:rPr lang="en-ID" dirty="0" err="1" smtClean="0"/>
+              <a:t>sekitar</a:t>
+            </a:r>
+            <a:r>
+              <a:rPr lang="en-ID" dirty="0" smtClean="0"/>
+              <a:t> </a:t>
+            </a:r>
+            <a:r>
+              <a:rPr lang="en-ID" dirty="0" err="1" smtClean="0"/>
+              <a:t>tanggal</a:t>
+            </a:r>
+            <a:r>
+              <a:rPr lang="en-ID" dirty="0" smtClean="0"/>
+              <a:t> 27 </a:t>
+            </a:r>
+            <a:r>
+              <a:rPr lang="en-ID" dirty="0" err="1" smtClean="0"/>
+              <a:t>Maret</a:t>
+            </a:r>
+            <a:r>
+              <a:rPr lang="en-ID" dirty="0" smtClean="0"/>
+              <a:t> 2020, </a:t>
+            </a:r>
+            <a:r>
+              <a:rPr lang="en-ID" dirty="0" err="1" smtClean="0"/>
+              <a:t>terjadi</a:t>
+            </a:r>
+            <a:r>
+              <a:rPr lang="en-ID" dirty="0" smtClean="0"/>
+              <a:t> </a:t>
+            </a:r>
+            <a:r>
+              <a:rPr lang="en-ID" dirty="0" err="1" smtClean="0"/>
+              <a:t>peningkatan</a:t>
+            </a:r>
+            <a:r>
+              <a:rPr lang="en-ID" dirty="0" smtClean="0"/>
+              <a:t> </a:t>
+            </a:r>
+            <a:r>
+              <a:rPr lang="en-ID" dirty="0" err="1" smtClean="0"/>
+              <a:t>jumlah</a:t>
+            </a:r>
+            <a:r>
+              <a:rPr lang="en-ID" dirty="0" smtClean="0"/>
+              <a:t> </a:t>
+            </a:r>
+            <a:r>
+              <a:rPr lang="en-ID" dirty="0" err="1" smtClean="0"/>
+              <a:t>kasus</a:t>
+            </a:r>
+            <a:r>
+              <a:rPr lang="en-ID" dirty="0" smtClean="0"/>
+              <a:t> yang </a:t>
+            </a:r>
+            <a:r>
+              <a:rPr lang="en-ID" dirty="0" err="1" smtClean="0"/>
+              <a:t>cukup</a:t>
+            </a:r>
+            <a:r>
+              <a:rPr lang="en-ID" dirty="0" smtClean="0"/>
+              <a:t> </a:t>
+            </a:r>
+            <a:r>
+              <a:rPr lang="en-ID" dirty="0" err="1" smtClean="0"/>
+              <a:t>signifikan</a:t>
+            </a:r>
+            <a:r>
+              <a:rPr lang="en-ID" dirty="0" smtClean="0"/>
+              <a:t> </a:t>
+            </a:r>
+            <a:r>
+              <a:rPr lang="en-ID" dirty="0" err="1" smtClean="0"/>
+              <a:t>akibat</a:t>
+            </a:r>
+            <a:r>
+              <a:rPr lang="en-ID" dirty="0" smtClean="0"/>
+              <a:t> </a:t>
+            </a:r>
+            <a:r>
+              <a:rPr lang="en-ID" dirty="0" err="1" smtClean="0"/>
+              <a:t>diadakan</a:t>
+            </a:r>
+            <a:r>
+              <a:rPr lang="en-ID" dirty="0" smtClean="0"/>
+              <a:t> rapid test di </a:t>
+            </a:r>
+            <a:r>
+              <a:rPr lang="en-ID" dirty="0" err="1" smtClean="0"/>
+              <a:t>beberapa</a:t>
+            </a:r>
+            <a:r>
+              <a:rPr lang="en-ID" dirty="0" smtClean="0"/>
+              <a:t> </a:t>
+            </a:r>
+            <a:r>
+              <a:rPr lang="en-ID" dirty="0" err="1" smtClean="0"/>
+              <a:t>daerah</a:t>
+            </a:r>
+            <a:endParaRPr lang="en-ID" dirty="0" smtClean="0"/>
+          </a:p>
+          <a:p>
+            <a:r>
+              <a:rPr lang="en-ID" dirty="0" smtClean="0"/>
+              <a:t>Data yang </a:t>
+            </a:r>
+            <a:r>
+              <a:rPr lang="en-ID" dirty="0" err="1" smtClean="0"/>
+              <a:t>digunakan</a:t>
+            </a:r>
+            <a:r>
+              <a:rPr lang="en-ID" dirty="0" smtClean="0"/>
+              <a:t> </a:t>
+            </a:r>
+            <a:r>
+              <a:rPr lang="en-ID" dirty="0" err="1" smtClean="0"/>
+              <a:t>untuk</a:t>
+            </a:r>
+            <a:r>
+              <a:rPr lang="en-ID" dirty="0" smtClean="0"/>
+              <a:t> </a:t>
+            </a:r>
+            <a:r>
+              <a:rPr lang="en-ID" dirty="0" err="1" smtClean="0"/>
+              <a:t>membuat</a:t>
+            </a:r>
+            <a:r>
+              <a:rPr lang="en-ID" dirty="0" smtClean="0"/>
+              <a:t> model </a:t>
+            </a:r>
+            <a:r>
+              <a:rPr lang="en-ID" dirty="0" err="1" smtClean="0"/>
+              <a:t>adalah</a:t>
             </a:r>
             <a:r>
               <a:rPr lang="en-ID" dirty="0" smtClean="0"/>
@@ -6092,103 +7381,19 @@
             </a:r>
             <a:r>
               <a:rPr lang="en-ID" dirty="0" err="1" smtClean="0"/>
-              <a:t>hasil</a:t>
-            </a:r>
-            <a:r>
-              <a:rPr lang="en-ID" dirty="0" smtClean="0"/>
-              <a:t> </a:t>
-            </a:r>
-            <a:r>
-              <a:rPr lang="en-ID" dirty="0" err="1" smtClean="0"/>
-              <a:t>prediksi</a:t>
-            </a:r>
-            <a:r>
-              <a:rPr lang="en-ID" dirty="0" smtClean="0"/>
-              <a:t> </a:t>
-            </a:r>
-            <a:r>
-              <a:rPr lang="en-ID" dirty="0" err="1" smtClean="0"/>
-              <a:t>dengan</a:t>
-            </a:r>
-            <a:r>
-              <a:rPr lang="en-ID" dirty="0" smtClean="0"/>
-              <a:t> data </a:t>
-            </a:r>
-            <a:r>
-              <a:rPr lang="en-ID" dirty="0" err="1" smtClean="0"/>
-              <a:t>asli</a:t>
-            </a:r>
-            <a:r>
-              <a:rPr lang="en-ID" dirty="0" smtClean="0"/>
-              <a:t> yang </a:t>
-            </a:r>
-            <a:r>
-              <a:rPr lang="en-ID" dirty="0" err="1" smtClean="0"/>
-              <a:t>dikeluarkan</a:t>
-            </a:r>
-            <a:r>
-              <a:rPr lang="en-ID" dirty="0" smtClean="0"/>
-              <a:t> </a:t>
-            </a:r>
-            <a:r>
-              <a:rPr lang="en-ID" dirty="0" err="1" smtClean="0"/>
-              <a:t>oleh</a:t>
-            </a:r>
-            <a:r>
-              <a:rPr lang="en-ID" dirty="0" smtClean="0"/>
-              <a:t> </a:t>
-            </a:r>
-            <a:r>
-              <a:rPr lang="en-ID" dirty="0" err="1" smtClean="0"/>
-              <a:t>pemerintah</a:t>
-            </a:r>
-            <a:r>
-              <a:rPr lang="en-ID" dirty="0" smtClean="0"/>
-              <a:t> </a:t>
-            </a:r>
-            <a:r>
-              <a:rPr lang="en-ID" dirty="0" err="1" smtClean="0"/>
-              <a:t>Republik</a:t>
-            </a:r>
-            <a:r>
-              <a:rPr lang="en-ID" dirty="0" smtClean="0"/>
-              <a:t> Indonesia</a:t>
-            </a:r>
-          </a:p>
-          <a:p>
-            <a:r>
-              <a:rPr lang="en-ID" dirty="0" smtClean="0"/>
-              <a:t>Data </a:t>
-            </a:r>
-            <a:r>
-              <a:rPr lang="en-ID" dirty="0" err="1" smtClean="0"/>
-              <a:t>asli</a:t>
-            </a:r>
-            <a:r>
-              <a:rPr lang="en-ID" dirty="0" smtClean="0"/>
-              <a:t> </a:t>
-            </a:r>
-            <a:r>
-              <a:rPr lang="en-ID" dirty="0" err="1" smtClean="0"/>
-              <a:t>diperoleh</a:t>
-            </a:r>
-            <a:r>
-              <a:rPr lang="en-ID" dirty="0" smtClean="0"/>
-              <a:t> </a:t>
-            </a:r>
-            <a:r>
-              <a:rPr lang="en-ID" dirty="0" err="1" smtClean="0"/>
-              <a:t>dari</a:t>
-            </a:r>
-            <a:r>
-              <a:rPr lang="en-ID" dirty="0" smtClean="0"/>
-              <a:t> </a:t>
-            </a:r>
-            <a:r>
-              <a:rPr lang="en-US" dirty="0" smtClean="0">
-                <a:hlinkClick r:id="rId2"/>
-              </a:rPr>
-              <a:t>https://www.covid19.go.id/situasi-virus-corona/</a:t>
+              <a:t>sebelum</a:t>
+            </a:r>
+            <a:r>
+              <a:rPr lang="en-ID" dirty="0" smtClean="0"/>
+              <a:t> </a:t>
+            </a:r>
+            <a:r>
+              <a:rPr lang="en-ID" dirty="0" err="1" smtClean="0"/>
+              <a:t>adanya</a:t>
+            </a:r>
+            <a:r>
+              <a:rPr lang="en-ID" dirty="0" smtClean="0"/>
+              <a:t> rapid test </a:t>
             </a:r>
             <a:endParaRPr lang="en-US" dirty="0"/>
           </a:p>
@@ -6197,7 +7402,7 @@
     </p:spTree>
     <p:extLst>
       <p:ext uri="{BB962C8B-B14F-4D97-AF65-F5344CB8AC3E}">
-        <p14:creationId xmlns:p14="http://schemas.microsoft.com/office/powerpoint/2010/main" val="1386090358"/>
+        <p14:creationId xmlns:p14="http://schemas.microsoft.com/office/powerpoint/2010/main" val="2792857039"/>
       </p:ext>
     </p:extLst>
   </p:cSld>

</xml_diff>